<commit_message>
Specific Une case ( in progress)
</commit_message>
<xml_diff>
--- a/documentation/docTravail/seancesTravail/Role4All_use_case/ExcelMetaModel.pptx
+++ b/documentation/docTravail/seancesTravail/Role4All_use_case/ExcelMetaModel.pptx
@@ -288,7 +288,7 @@
           <a:p>
             <a:fld id="{D073B194-33B6-4ABB-821F-8882D458804A}" type="datetimeFigureOut">
               <a:rPr lang="en-US" smtClean="0"/>
-              <a:t>12/9/2015</a:t>
+              <a:t>1/6/2016</a:t>
             </a:fld>
             <a:endParaRPr lang="en-US"/>
           </a:p>
@@ -458,7 +458,7 @@
           <a:p>
             <a:fld id="{D073B194-33B6-4ABB-821F-8882D458804A}" type="datetimeFigureOut">
               <a:rPr lang="en-US" smtClean="0"/>
-              <a:t>12/9/2015</a:t>
+              <a:t>1/6/2016</a:t>
             </a:fld>
             <a:endParaRPr lang="en-US"/>
           </a:p>
@@ -638,7 +638,7 @@
           <a:p>
             <a:fld id="{D073B194-33B6-4ABB-821F-8882D458804A}" type="datetimeFigureOut">
               <a:rPr lang="en-US" smtClean="0"/>
-              <a:t>12/9/2015</a:t>
+              <a:t>1/6/2016</a:t>
             </a:fld>
             <a:endParaRPr lang="en-US"/>
           </a:p>
@@ -808,7 +808,7 @@
           <a:p>
             <a:fld id="{D073B194-33B6-4ABB-821F-8882D458804A}" type="datetimeFigureOut">
               <a:rPr lang="en-US" smtClean="0"/>
-              <a:t>12/9/2015</a:t>
+              <a:t>1/6/2016</a:t>
             </a:fld>
             <a:endParaRPr lang="en-US"/>
           </a:p>
@@ -1054,7 +1054,7 @@
           <a:p>
             <a:fld id="{D073B194-33B6-4ABB-821F-8882D458804A}" type="datetimeFigureOut">
               <a:rPr lang="en-US" smtClean="0"/>
-              <a:t>12/9/2015</a:t>
+              <a:t>1/6/2016</a:t>
             </a:fld>
             <a:endParaRPr lang="en-US"/>
           </a:p>
@@ -1342,7 +1342,7 @@
           <a:p>
             <a:fld id="{D073B194-33B6-4ABB-821F-8882D458804A}" type="datetimeFigureOut">
               <a:rPr lang="en-US" smtClean="0"/>
-              <a:t>12/9/2015</a:t>
+              <a:t>1/6/2016</a:t>
             </a:fld>
             <a:endParaRPr lang="en-US"/>
           </a:p>
@@ -1764,7 +1764,7 @@
           <a:p>
             <a:fld id="{D073B194-33B6-4ABB-821F-8882D458804A}" type="datetimeFigureOut">
               <a:rPr lang="en-US" smtClean="0"/>
-              <a:t>12/9/2015</a:t>
+              <a:t>1/6/2016</a:t>
             </a:fld>
             <a:endParaRPr lang="en-US"/>
           </a:p>
@@ -1882,7 +1882,7 @@
           <a:p>
             <a:fld id="{D073B194-33B6-4ABB-821F-8882D458804A}" type="datetimeFigureOut">
               <a:rPr lang="en-US" smtClean="0"/>
-              <a:t>12/9/2015</a:t>
+              <a:t>1/6/2016</a:t>
             </a:fld>
             <a:endParaRPr lang="en-US"/>
           </a:p>
@@ -1977,7 +1977,7 @@
           <a:p>
             <a:fld id="{D073B194-33B6-4ABB-821F-8882D458804A}" type="datetimeFigureOut">
               <a:rPr lang="en-US" smtClean="0"/>
-              <a:t>12/9/2015</a:t>
+              <a:t>1/6/2016</a:t>
             </a:fld>
             <a:endParaRPr lang="en-US"/>
           </a:p>
@@ -2254,7 +2254,7 @@
           <a:p>
             <a:fld id="{D073B194-33B6-4ABB-821F-8882D458804A}" type="datetimeFigureOut">
               <a:rPr lang="en-US" smtClean="0"/>
-              <a:t>12/9/2015</a:t>
+              <a:t>1/6/2016</a:t>
             </a:fld>
             <a:endParaRPr lang="en-US"/>
           </a:p>
@@ -2507,7 +2507,7 @@
           <a:p>
             <a:fld id="{D073B194-33B6-4ABB-821F-8882D458804A}" type="datetimeFigureOut">
               <a:rPr lang="en-US" smtClean="0"/>
-              <a:t>12/9/2015</a:t>
+              <a:t>1/6/2016</a:t>
             </a:fld>
             <a:endParaRPr lang="en-US"/>
           </a:p>
@@ -2720,7 +2720,7 @@
           <a:p>
             <a:fld id="{D073B194-33B6-4ABB-821F-8882D458804A}" type="datetimeFigureOut">
               <a:rPr lang="en-US" smtClean="0"/>
-              <a:t>12/9/2015</a:t>
+              <a:t>1/6/2016</a:t>
             </a:fld>
             <a:endParaRPr lang="en-US"/>
           </a:p>
@@ -3095,379 +3095,118 @@
           <a:chExt cx="0" cy="0"/>
         </a:xfrm>
       </p:grpSpPr>
+      <p:sp>
+        <p:nvSpPr>
+          <p:cNvPr id="8" name="ZoneTexte 7"/>
+          <p:cNvSpPr txBox="1"/>
+          <p:nvPr/>
+        </p:nvSpPr>
+        <p:spPr>
+          <a:xfrm>
+            <a:off x="2198512" y="3131676"/>
+            <a:ext cx="300082" cy="369332"/>
+          </a:xfrm>
+          <a:prstGeom prst="rect">
+            <a:avLst/>
+          </a:prstGeom>
+          <a:noFill/>
+        </p:spPr>
+        <p:txBody>
+          <a:bodyPr wrap="none" rtlCol="0">
+            <a:spAutoFit/>
+          </a:bodyPr>
+          <a:lstStyle/>
+          <a:p>
+            <a:r>
+              <a:rPr lang="fr-FR" dirty="0" smtClean="0"/>
+              <a:t>*</a:t>
+            </a:r>
+            <a:endParaRPr lang="en-US" dirty="0"/>
+          </a:p>
+        </p:txBody>
+      </p:sp>
       <p:grpSp>
         <p:nvGrpSpPr>
-          <p:cNvPr id="2" name="Groupe 1"/>
+          <p:cNvPr id="15" name="Groupe 14"/>
           <p:cNvGrpSpPr/>
           <p:nvPr/>
         </p:nvGrpSpPr>
         <p:grpSpPr>
           <a:xfrm>
-            <a:off x="2555776" y="332656"/>
-            <a:ext cx="4104456" cy="3528392"/>
-            <a:chOff x="2555776" y="332656"/>
-            <a:chExt cx="4104456" cy="3528392"/>
+            <a:off x="2483768" y="598294"/>
+            <a:ext cx="4104456" cy="796734"/>
+            <a:chOff x="2553866" y="717413"/>
+            <a:chExt cx="4104456" cy="796734"/>
           </a:xfrm>
         </p:grpSpPr>
-        <p:grpSp>
-          <p:nvGrpSpPr>
-            <p:cNvPr id="17" name="Groupe 16"/>
-            <p:cNvGrpSpPr/>
-            <p:nvPr/>
-          </p:nvGrpSpPr>
-          <p:grpSpPr>
-            <a:xfrm>
-              <a:off x="2555776" y="332656"/>
-              <a:ext cx="4104456" cy="3528392"/>
-              <a:chOff x="2555776" y="332656"/>
-              <a:chExt cx="4104456" cy="3528392"/>
-            </a:xfrm>
-          </p:grpSpPr>
-          <p:grpSp>
-            <p:nvGrpSpPr>
-              <p:cNvPr id="16" name="Groupe 15"/>
-              <p:cNvGrpSpPr/>
-              <p:nvPr/>
-            </p:nvGrpSpPr>
-            <p:grpSpPr>
-              <a:xfrm>
-                <a:off x="4608004" y="1556792"/>
-                <a:ext cx="301686" cy="1152128"/>
-                <a:chOff x="4608004" y="1556792"/>
-                <a:chExt cx="301686" cy="1152128"/>
-              </a:xfrm>
-            </p:grpSpPr>
-            <p:cxnSp>
-              <p:nvCxnSpPr>
-                <p:cNvPr id="7" name="Connecteur droit 6"/>
-                <p:cNvCxnSpPr>
-                  <a:stCxn id="4" idx="2"/>
-                  <a:endCxn id="5" idx="0"/>
-                </p:cNvCxnSpPr>
-                <p:nvPr/>
-              </p:nvCxnSpPr>
-              <p:spPr>
-                <a:xfrm>
-                  <a:off x="4608004" y="1556792"/>
-                  <a:ext cx="0" cy="1152128"/>
-                </a:xfrm>
-                <a:prstGeom prst="line">
-                  <a:avLst/>
-                </a:prstGeom>
-              </p:spPr>
-              <p:style>
-                <a:lnRef idx="3">
-                  <a:schemeClr val="accent1"/>
-                </a:lnRef>
-                <a:fillRef idx="0">
-                  <a:schemeClr val="accent1"/>
-                </a:fillRef>
-                <a:effectRef idx="2">
-                  <a:schemeClr val="accent1"/>
-                </a:effectRef>
-                <a:fontRef idx="minor">
-                  <a:schemeClr val="tx1"/>
-                </a:fontRef>
-              </p:style>
-            </p:cxnSp>
-            <p:sp>
-              <p:nvSpPr>
-                <p:cNvPr id="8" name="ZoneTexte 7"/>
-                <p:cNvSpPr txBox="1"/>
-                <p:nvPr/>
-              </p:nvSpPr>
-              <p:spPr>
-                <a:xfrm>
-                  <a:off x="4608004" y="1556792"/>
-                  <a:ext cx="300082" cy="369332"/>
-                </a:xfrm>
-                <a:prstGeom prst="rect">
-                  <a:avLst/>
-                </a:prstGeom>
-                <a:noFill/>
-              </p:spPr>
-              <p:txBody>
-                <a:bodyPr wrap="none" rtlCol="0">
-                  <a:spAutoFit/>
-                </a:bodyPr>
-                <a:lstStyle/>
-                <a:p>
-                  <a:r>
-                    <a:rPr lang="fr-FR" dirty="0" smtClean="0"/>
-                    <a:t>*</a:t>
-                  </a:r>
-                  <a:endParaRPr lang="en-US" dirty="0"/>
-                </a:p>
-              </p:txBody>
-            </p:sp>
-            <p:sp>
-              <p:nvSpPr>
-                <p:cNvPr id="9" name="ZoneTexte 8"/>
-                <p:cNvSpPr txBox="1"/>
-                <p:nvPr/>
-              </p:nvSpPr>
-              <p:spPr>
-                <a:xfrm>
-                  <a:off x="4608004" y="2339588"/>
-                  <a:ext cx="301686" cy="369332"/>
-                </a:xfrm>
-                <a:prstGeom prst="rect">
-                  <a:avLst/>
-                </a:prstGeom>
-                <a:noFill/>
-              </p:spPr>
-              <p:txBody>
-                <a:bodyPr wrap="none" rtlCol="0">
-                  <a:spAutoFit/>
-                </a:bodyPr>
-                <a:lstStyle/>
-                <a:p>
-                  <a:r>
-                    <a:rPr lang="fr-FR" dirty="0" smtClean="0"/>
-                    <a:t>1</a:t>
-                  </a:r>
-                  <a:endParaRPr lang="en-US" dirty="0"/>
-                </a:p>
-              </p:txBody>
-            </p:sp>
-          </p:grpSp>
-          <p:grpSp>
-            <p:nvGrpSpPr>
-              <p:cNvPr id="15" name="Groupe 14"/>
-              <p:cNvGrpSpPr/>
-              <p:nvPr/>
-            </p:nvGrpSpPr>
-            <p:grpSpPr>
-              <a:xfrm>
-                <a:off x="2555776" y="332656"/>
-                <a:ext cx="4104456" cy="1224136"/>
-                <a:chOff x="2555776" y="332656"/>
-                <a:chExt cx="4104456" cy="1224136"/>
-              </a:xfrm>
-            </p:grpSpPr>
-            <p:sp>
-              <p:nvSpPr>
-                <p:cNvPr id="4" name="Rectangle 3"/>
-                <p:cNvSpPr/>
-                <p:nvPr/>
-              </p:nvSpPr>
-              <p:spPr>
-                <a:xfrm>
-                  <a:off x="2555776" y="332656"/>
-                  <a:ext cx="4104456" cy="1224136"/>
-                </a:xfrm>
-                <a:prstGeom prst="rect">
-                  <a:avLst/>
-                </a:prstGeom>
-              </p:spPr>
-              <p:style>
-                <a:lnRef idx="2">
-                  <a:schemeClr val="accent1"/>
-                </a:lnRef>
-                <a:fillRef idx="1">
-                  <a:schemeClr val="lt1"/>
-                </a:fillRef>
-                <a:effectRef idx="0">
-                  <a:schemeClr val="accent1"/>
-                </a:effectRef>
-                <a:fontRef idx="minor">
-                  <a:schemeClr val="dk1"/>
-                </a:fontRef>
-              </p:style>
-              <p:txBody>
-                <a:bodyPr rtlCol="0" anchor="t" anchorCtr="0"/>
-                <a:lstStyle/>
-                <a:p>
-                  <a:pPr algn="ctr"/>
-                  <a:r>
-                    <a:rPr lang="fr-FR" b="1" dirty="0" smtClean="0">
-                      <a:effectLst>
-                        <a:outerShdw blurRad="38100" dist="38100" dir="2700000" algn="tl">
-                          <a:srgbClr val="000000">
-                            <a:alpha val="43137"/>
-                          </a:srgbClr>
-                        </a:outerShdw>
-                      </a:effectLst>
-                    </a:rPr>
-                    <a:t>Excel </a:t>
-                  </a:r>
-                  <a:r>
-                    <a:rPr lang="fr-FR" b="1" dirty="0" err="1" smtClean="0">
-                      <a:effectLst>
-                        <a:outerShdw blurRad="38100" dist="38100" dir="2700000" algn="tl">
-                          <a:srgbClr val="000000">
-                            <a:alpha val="43137"/>
-                          </a:srgbClr>
-                        </a:outerShdw>
-                      </a:effectLst>
-                    </a:rPr>
-                    <a:t>workbook</a:t>
-                  </a:r>
-                  <a:endParaRPr lang="en-US" b="1" dirty="0">
-                    <a:effectLst>
-                      <a:outerShdw blurRad="38100" dist="38100" dir="2700000" algn="tl">
-                        <a:srgbClr val="000000">
-                          <a:alpha val="43137"/>
-                        </a:srgbClr>
-                      </a:outerShdw>
-                    </a:effectLst>
-                  </a:endParaRPr>
-                </a:p>
-              </p:txBody>
-            </p:sp>
-            <p:sp>
-              <p:nvSpPr>
-                <p:cNvPr id="10" name="ZoneTexte 9"/>
-                <p:cNvSpPr txBox="1"/>
-                <p:nvPr/>
-              </p:nvSpPr>
-              <p:spPr>
-                <a:xfrm>
-                  <a:off x="3904925" y="944724"/>
-                  <a:ext cx="1378904" cy="369332"/>
-                </a:xfrm>
-                <a:prstGeom prst="rect">
-                  <a:avLst/>
-                </a:prstGeom>
-                <a:noFill/>
-              </p:spPr>
-              <p:txBody>
-                <a:bodyPr wrap="none" rtlCol="0">
-                  <a:spAutoFit/>
-                </a:bodyPr>
-                <a:lstStyle/>
-                <a:p>
-                  <a:r>
-                    <a:rPr lang="fr-FR"/>
-                    <a:t>n</a:t>
-                  </a:r>
-                  <a:r>
-                    <a:rPr lang="fr-FR" smtClean="0"/>
-                    <a:t>ame</a:t>
-                  </a:r>
-                  <a:r>
-                    <a:rPr lang="fr-FR" dirty="0" smtClean="0"/>
-                    <a:t>: String</a:t>
-                  </a:r>
-                  <a:endParaRPr lang="en-US" dirty="0"/>
-                </a:p>
-              </p:txBody>
-            </p:sp>
-          </p:grpSp>
-          <p:grpSp>
-            <p:nvGrpSpPr>
-              <p:cNvPr id="14" name="Groupe 13"/>
-              <p:cNvGrpSpPr/>
-              <p:nvPr/>
-            </p:nvGrpSpPr>
-            <p:grpSpPr>
-              <a:xfrm>
-                <a:off x="3582620" y="2708920"/>
-                <a:ext cx="2050767" cy="1152128"/>
-                <a:chOff x="3817376" y="2708920"/>
-                <a:chExt cx="2050767" cy="1152128"/>
-              </a:xfrm>
-            </p:grpSpPr>
-            <p:sp>
-              <p:nvSpPr>
-                <p:cNvPr id="5" name="Rectangle 4"/>
-                <p:cNvSpPr/>
-                <p:nvPr/>
-              </p:nvSpPr>
-              <p:spPr>
-                <a:xfrm>
-                  <a:off x="3817376" y="2708920"/>
-                  <a:ext cx="2050767" cy="1152128"/>
-                </a:xfrm>
-                <a:prstGeom prst="rect">
-                  <a:avLst/>
-                </a:prstGeom>
-              </p:spPr>
-              <p:style>
-                <a:lnRef idx="2">
-                  <a:schemeClr val="accent1"/>
-                </a:lnRef>
-                <a:fillRef idx="1">
-                  <a:schemeClr val="lt1"/>
-                </a:fillRef>
-                <a:effectRef idx="0">
-                  <a:schemeClr val="accent1"/>
-                </a:effectRef>
-                <a:fontRef idx="minor">
-                  <a:schemeClr val="dk1"/>
-                </a:fontRef>
-              </p:style>
-              <p:txBody>
-                <a:bodyPr rtlCol="0" anchor="t" anchorCtr="0"/>
-                <a:lstStyle/>
-                <a:p>
-                  <a:pPr algn="ctr"/>
-                  <a:r>
-                    <a:rPr lang="fr-FR" b="1" dirty="0" smtClean="0">
-                      <a:effectLst>
-                        <a:outerShdw blurRad="38100" dist="38100" dir="2700000" algn="tl">
-                          <a:srgbClr val="000000">
-                            <a:alpha val="43137"/>
-                          </a:srgbClr>
-                        </a:outerShdw>
-                      </a:effectLst>
-                    </a:rPr>
-                    <a:t>Excel element</a:t>
-                  </a:r>
-                  <a:endParaRPr lang="en-US" b="1" dirty="0">
-                    <a:effectLst>
-                      <a:outerShdw blurRad="38100" dist="38100" dir="2700000" algn="tl">
-                        <a:srgbClr val="000000">
-                          <a:alpha val="43137"/>
-                        </a:srgbClr>
-                      </a:outerShdw>
-                    </a:effectLst>
-                  </a:endParaRPr>
-                </a:p>
-              </p:txBody>
-            </p:sp>
-            <p:sp>
-              <p:nvSpPr>
-                <p:cNvPr id="11" name="ZoneTexte 10"/>
-                <p:cNvSpPr txBox="1"/>
-                <p:nvPr/>
-              </p:nvSpPr>
-              <p:spPr>
-                <a:xfrm>
-                  <a:off x="4168632" y="3457058"/>
-                  <a:ext cx="1348254" cy="369332"/>
-                </a:xfrm>
-                <a:prstGeom prst="rect">
-                  <a:avLst/>
-                </a:prstGeom>
-                <a:noFill/>
-              </p:spPr>
-              <p:txBody>
-                <a:bodyPr wrap="none" rtlCol="0">
-                  <a:spAutoFit/>
-                </a:bodyPr>
-                <a:lstStyle/>
-                <a:p>
-                  <a:r>
-                    <a:rPr lang="fr-FR" dirty="0" smtClean="0"/>
-                    <a:t>value: String</a:t>
-                  </a:r>
-                  <a:endParaRPr lang="en-US" dirty="0"/>
-                </a:p>
-              </p:txBody>
-            </p:sp>
-          </p:grpSp>
-        </p:grpSp>
         <p:sp>
           <p:nvSpPr>
-            <p:cNvPr id="13" name="ZoneTexte 12"/>
+            <p:cNvPr id="4" name="Rectangle 3"/>
+            <p:cNvSpPr/>
+            <p:nvPr/>
+          </p:nvSpPr>
+          <p:spPr>
+            <a:xfrm>
+              <a:off x="2553866" y="717413"/>
+              <a:ext cx="4104456" cy="796734"/>
+            </a:xfrm>
+            <a:prstGeom prst="rect">
+              <a:avLst/>
+            </a:prstGeom>
+          </p:spPr>
+          <p:style>
+            <a:lnRef idx="2">
+              <a:schemeClr val="accent1"/>
+            </a:lnRef>
+            <a:fillRef idx="1">
+              <a:schemeClr val="lt1"/>
+            </a:fillRef>
+            <a:effectRef idx="0">
+              <a:schemeClr val="accent1"/>
+            </a:effectRef>
+            <a:fontRef idx="minor">
+              <a:schemeClr val="dk1"/>
+            </a:fontRef>
+          </p:style>
+          <p:txBody>
+            <a:bodyPr rtlCol="0" anchor="t" anchorCtr="0"/>
+            <a:lstStyle/>
+            <a:p>
+              <a:pPr algn="ctr"/>
+              <a:r>
+                <a:rPr lang="fr-FR" b="1" dirty="0" err="1" smtClean="0">
+                  <a:effectLst>
+                    <a:outerShdw blurRad="38100" dist="38100" dir="2700000" algn="tl">
+                      <a:srgbClr val="000000">
+                        <a:alpha val="43137"/>
+                      </a:srgbClr>
+                    </a:outerShdw>
+                  </a:effectLst>
+                </a:rPr>
+                <a:t>ExcelElement</a:t>
+              </a:r>
+              <a:endParaRPr lang="en-US" b="1" dirty="0">
+                <a:effectLst>
+                  <a:outerShdw blurRad="38100" dist="38100" dir="2700000" algn="tl">
+                    <a:srgbClr val="000000">
+                      <a:alpha val="43137"/>
+                    </a:srgbClr>
+                  </a:outerShdw>
+                </a:effectLst>
+              </a:endParaRPr>
+            </a:p>
+          </p:txBody>
+        </p:sp>
+        <p:sp>
+          <p:nvSpPr>
+            <p:cNvPr id="10" name="ZoneTexte 9"/>
             <p:cNvSpPr txBox="1"/>
             <p:nvPr/>
           </p:nvSpPr>
           <p:spPr>
             <a:xfrm>
-              <a:off x="4027203" y="3125554"/>
-              <a:ext cx="1161600" cy="369332"/>
+              <a:off x="4095377" y="1050760"/>
+              <a:ext cx="1021433" cy="369332"/>
             </a:xfrm>
             <a:prstGeom prst="rect">
               <a:avLst/>
@@ -3482,13 +3221,1312 @@
             <a:p>
               <a:r>
                 <a:rPr lang="fr-FR" dirty="0" smtClean="0"/>
-                <a:t>key: String</a:t>
+                <a:t>id: String</a:t>
               </a:r>
               <a:endParaRPr lang="en-US" dirty="0"/>
             </a:p>
           </p:txBody>
         </p:sp>
       </p:grpSp>
+      <p:sp>
+        <p:nvSpPr>
+          <p:cNvPr id="5" name="Rectangle 4"/>
+          <p:cNvSpPr/>
+          <p:nvPr/>
+        </p:nvSpPr>
+        <p:spPr>
+          <a:xfrm>
+            <a:off x="4716016" y="2882104"/>
+            <a:ext cx="1800200" cy="1771032"/>
+          </a:xfrm>
+          <a:prstGeom prst="rect">
+            <a:avLst/>
+          </a:prstGeom>
+        </p:spPr>
+        <p:style>
+          <a:lnRef idx="2">
+            <a:schemeClr val="accent1"/>
+          </a:lnRef>
+          <a:fillRef idx="1">
+            <a:schemeClr val="lt1"/>
+          </a:fillRef>
+          <a:effectRef idx="0">
+            <a:schemeClr val="accent1"/>
+          </a:effectRef>
+          <a:fontRef idx="minor">
+            <a:schemeClr val="dk1"/>
+          </a:fontRef>
+        </p:style>
+        <p:txBody>
+          <a:bodyPr rtlCol="0" anchor="t" anchorCtr="0"/>
+          <a:lstStyle/>
+          <a:p>
+            <a:pPr algn="ctr"/>
+            <a:r>
+              <a:rPr lang="fr-FR" b="1" dirty="0" err="1" smtClean="0">
+                <a:effectLst>
+                  <a:outerShdw blurRad="38100" dist="38100" dir="2700000" algn="tl">
+                    <a:srgbClr val="000000">
+                      <a:alpha val="43137"/>
+                    </a:srgbClr>
+                  </a:outerShdw>
+                </a:effectLst>
+              </a:rPr>
+              <a:t>ExcelCell</a:t>
+            </a:r>
+            <a:endParaRPr lang="en-US" b="1" dirty="0">
+              <a:effectLst>
+                <a:outerShdw blurRad="38100" dist="38100" dir="2700000" algn="tl">
+                  <a:srgbClr val="000000">
+                    <a:alpha val="43137"/>
+                  </a:srgbClr>
+                </a:outerShdw>
+              </a:effectLst>
+            </a:endParaRPr>
+          </a:p>
+        </p:txBody>
+      </p:sp>
+      <p:sp>
+        <p:nvSpPr>
+          <p:cNvPr id="11" name="ZoneTexte 10"/>
+          <p:cNvSpPr txBox="1"/>
+          <p:nvPr/>
+        </p:nvSpPr>
+        <p:spPr>
+          <a:xfrm>
+            <a:off x="4991634" y="3923764"/>
+            <a:ext cx="1348254" cy="369332"/>
+          </a:xfrm>
+          <a:prstGeom prst="rect">
+            <a:avLst/>
+          </a:prstGeom>
+          <a:noFill/>
+        </p:spPr>
+        <p:txBody>
+          <a:bodyPr wrap="none" rtlCol="0">
+            <a:spAutoFit/>
+          </a:bodyPr>
+          <a:lstStyle/>
+          <a:p>
+            <a:r>
+              <a:rPr lang="fr-FR" dirty="0" smtClean="0"/>
+              <a:t>value: String</a:t>
+            </a:r>
+            <a:endParaRPr lang="en-US" dirty="0"/>
+          </a:p>
+        </p:txBody>
+      </p:sp>
+      <p:sp>
+        <p:nvSpPr>
+          <p:cNvPr id="13" name="ZoneTexte 12"/>
+          <p:cNvSpPr txBox="1"/>
+          <p:nvPr/>
+        </p:nvSpPr>
+        <p:spPr>
+          <a:xfrm>
+            <a:off x="5039719" y="3212976"/>
+            <a:ext cx="1332481" cy="369332"/>
+          </a:xfrm>
+          <a:prstGeom prst="rect">
+            <a:avLst/>
+          </a:prstGeom>
+          <a:noFill/>
+        </p:spPr>
+        <p:txBody>
+          <a:bodyPr wrap="none" rtlCol="0">
+            <a:spAutoFit/>
+          </a:bodyPr>
+          <a:lstStyle/>
+          <a:p>
+            <a:r>
+              <a:rPr lang="fr-FR" dirty="0" smtClean="0"/>
+              <a:t>row: Integer</a:t>
+            </a:r>
+            <a:endParaRPr lang="en-US" dirty="0"/>
+          </a:p>
+        </p:txBody>
+      </p:sp>
+      <p:sp>
+        <p:nvSpPr>
+          <p:cNvPr id="18" name="ZoneTexte 17"/>
+          <p:cNvSpPr txBox="1"/>
+          <p:nvPr/>
+        </p:nvSpPr>
+        <p:spPr>
+          <a:xfrm>
+            <a:off x="4775610" y="3573016"/>
+            <a:ext cx="1668598" cy="369332"/>
+          </a:xfrm>
+          <a:prstGeom prst="rect">
+            <a:avLst/>
+          </a:prstGeom>
+          <a:noFill/>
+        </p:spPr>
+        <p:txBody>
+          <a:bodyPr wrap="none" rtlCol="0">
+            <a:spAutoFit/>
+          </a:bodyPr>
+          <a:lstStyle/>
+          <a:p>
+            <a:r>
+              <a:rPr lang="fr-FR" dirty="0" smtClean="0"/>
+              <a:t>column: Integer</a:t>
+            </a:r>
+            <a:endParaRPr lang="en-US" dirty="0"/>
+          </a:p>
+        </p:txBody>
+      </p:sp>
+      <p:sp>
+        <p:nvSpPr>
+          <p:cNvPr id="31" name="ZoneTexte 30"/>
+          <p:cNvSpPr txBox="1"/>
+          <p:nvPr/>
+        </p:nvSpPr>
+        <p:spPr>
+          <a:xfrm>
+            <a:off x="4415934" y="3100318"/>
+            <a:ext cx="300082" cy="369332"/>
+          </a:xfrm>
+          <a:prstGeom prst="rect">
+            <a:avLst/>
+          </a:prstGeom>
+          <a:noFill/>
+        </p:spPr>
+        <p:txBody>
+          <a:bodyPr wrap="none" rtlCol="0">
+            <a:spAutoFit/>
+          </a:bodyPr>
+          <a:lstStyle/>
+          <a:p>
+            <a:r>
+              <a:rPr lang="fr-FR" dirty="0" smtClean="0"/>
+              <a:t>*</a:t>
+            </a:r>
+            <a:endParaRPr lang="en-US" dirty="0"/>
+          </a:p>
+        </p:txBody>
+      </p:sp>
+      <p:cxnSp>
+        <p:nvCxnSpPr>
+          <p:cNvPr id="33" name="Connecteur en angle 32"/>
+          <p:cNvCxnSpPr>
+            <a:stCxn id="5" idx="0"/>
+            <a:endCxn id="4" idx="2"/>
+          </p:cNvCxnSpPr>
+          <p:nvPr/>
+        </p:nvCxnSpPr>
+        <p:spPr>
+          <a:xfrm rot="16200000" flipV="1">
+            <a:off x="4332518" y="1598506"/>
+            <a:ext cx="1487076" cy="1080120"/>
+          </a:xfrm>
+          <a:prstGeom prst="bentConnector3">
+            <a:avLst>
+              <a:gd name="adj1" fmla="val 50000"/>
+            </a:avLst>
+          </a:prstGeom>
+          <a:ln>
+            <a:tailEnd type="triangle" w="lg" len="lg"/>
+          </a:ln>
+        </p:spPr>
+        <p:style>
+          <a:lnRef idx="3">
+            <a:schemeClr val="dk1"/>
+          </a:lnRef>
+          <a:fillRef idx="0">
+            <a:schemeClr val="dk1"/>
+          </a:fillRef>
+          <a:effectRef idx="2">
+            <a:schemeClr val="dk1"/>
+          </a:effectRef>
+          <a:fontRef idx="minor">
+            <a:schemeClr val="tx1"/>
+          </a:fontRef>
+        </p:style>
+      </p:cxnSp>
+      <p:sp>
+        <p:nvSpPr>
+          <p:cNvPr id="70" name="Rectangle 69"/>
+          <p:cNvSpPr/>
+          <p:nvPr/>
+        </p:nvSpPr>
+        <p:spPr>
+          <a:xfrm>
+            <a:off x="99456" y="2882656"/>
+            <a:ext cx="1800200" cy="1225773"/>
+          </a:xfrm>
+          <a:prstGeom prst="rect">
+            <a:avLst/>
+          </a:prstGeom>
+        </p:spPr>
+        <p:style>
+          <a:lnRef idx="2">
+            <a:schemeClr val="accent1"/>
+          </a:lnRef>
+          <a:fillRef idx="1">
+            <a:schemeClr val="lt1"/>
+          </a:fillRef>
+          <a:effectRef idx="0">
+            <a:schemeClr val="accent1"/>
+          </a:effectRef>
+          <a:fontRef idx="minor">
+            <a:schemeClr val="dk1"/>
+          </a:fontRef>
+        </p:style>
+        <p:txBody>
+          <a:bodyPr rtlCol="0" anchor="t" anchorCtr="0"/>
+          <a:lstStyle/>
+          <a:p>
+            <a:pPr algn="ctr"/>
+            <a:r>
+              <a:rPr lang="fr-FR" b="1" smtClean="0">
+                <a:effectLst>
+                  <a:outerShdw blurRad="38100" dist="38100" dir="2700000" algn="tl">
+                    <a:srgbClr val="000000">
+                      <a:alpha val="43137"/>
+                    </a:srgbClr>
+                  </a:outerShdw>
+                </a:effectLst>
+              </a:rPr>
+              <a:t>ExcelWorkbook</a:t>
+            </a:r>
+            <a:endParaRPr lang="en-US" b="1" dirty="0">
+              <a:effectLst>
+                <a:outerShdw blurRad="38100" dist="38100" dir="2700000" algn="tl">
+                  <a:srgbClr val="000000">
+                    <a:alpha val="43137"/>
+                  </a:srgbClr>
+                </a:outerShdw>
+              </a:effectLst>
+            </a:endParaRPr>
+          </a:p>
+        </p:txBody>
+      </p:sp>
+      <p:sp>
+        <p:nvSpPr>
+          <p:cNvPr id="71" name="ZoneTexte 70"/>
+          <p:cNvSpPr txBox="1"/>
+          <p:nvPr/>
+        </p:nvSpPr>
+        <p:spPr>
+          <a:xfrm>
+            <a:off x="312776" y="3212976"/>
+            <a:ext cx="1378904" cy="369332"/>
+          </a:xfrm>
+          <a:prstGeom prst="rect">
+            <a:avLst/>
+          </a:prstGeom>
+          <a:noFill/>
+        </p:spPr>
+        <p:txBody>
+          <a:bodyPr wrap="none" rtlCol="0">
+            <a:spAutoFit/>
+          </a:bodyPr>
+          <a:lstStyle/>
+          <a:p>
+            <a:r>
+              <a:rPr lang="fr-FR" dirty="0" smtClean="0"/>
+              <a:t>name: String</a:t>
+            </a:r>
+            <a:endParaRPr lang="en-US" dirty="0"/>
+          </a:p>
+        </p:txBody>
+      </p:sp>
+      <p:sp>
+        <p:nvSpPr>
+          <p:cNvPr id="72" name="Rectangle 71"/>
+          <p:cNvSpPr/>
+          <p:nvPr/>
+        </p:nvSpPr>
+        <p:spPr>
+          <a:xfrm>
+            <a:off x="2489809" y="2882656"/>
+            <a:ext cx="1368152" cy="1225774"/>
+          </a:xfrm>
+          <a:prstGeom prst="rect">
+            <a:avLst/>
+          </a:prstGeom>
+        </p:spPr>
+        <p:style>
+          <a:lnRef idx="2">
+            <a:schemeClr val="accent1"/>
+          </a:lnRef>
+          <a:fillRef idx="1">
+            <a:schemeClr val="lt1"/>
+          </a:fillRef>
+          <a:effectRef idx="0">
+            <a:schemeClr val="accent1"/>
+          </a:effectRef>
+          <a:fontRef idx="minor">
+            <a:schemeClr val="dk1"/>
+          </a:fontRef>
+        </p:style>
+        <p:txBody>
+          <a:bodyPr rtlCol="0" anchor="t" anchorCtr="0"/>
+          <a:lstStyle/>
+          <a:p>
+            <a:pPr algn="ctr"/>
+            <a:r>
+              <a:rPr lang="fr-FR" b="1" dirty="0" err="1" smtClean="0">
+                <a:effectLst>
+                  <a:outerShdw blurRad="38100" dist="38100" dir="2700000" algn="tl">
+                    <a:srgbClr val="000000">
+                      <a:alpha val="43137"/>
+                    </a:srgbClr>
+                  </a:outerShdw>
+                </a:effectLst>
+              </a:rPr>
+              <a:t>ExcelSheet</a:t>
+            </a:r>
+            <a:endParaRPr lang="en-US" b="1" dirty="0">
+              <a:effectLst>
+                <a:outerShdw blurRad="38100" dist="38100" dir="2700000" algn="tl">
+                  <a:srgbClr val="000000">
+                    <a:alpha val="43137"/>
+                  </a:srgbClr>
+                </a:outerShdw>
+              </a:effectLst>
+            </a:endParaRPr>
+          </a:p>
+        </p:txBody>
+      </p:sp>
+      <p:sp>
+        <p:nvSpPr>
+          <p:cNvPr id="73" name="ZoneTexte 72"/>
+          <p:cNvSpPr txBox="1"/>
+          <p:nvPr/>
+        </p:nvSpPr>
+        <p:spPr>
+          <a:xfrm>
+            <a:off x="2483768" y="3212976"/>
+            <a:ext cx="1378904" cy="369332"/>
+          </a:xfrm>
+          <a:prstGeom prst="rect">
+            <a:avLst/>
+          </a:prstGeom>
+          <a:noFill/>
+        </p:spPr>
+        <p:txBody>
+          <a:bodyPr wrap="none" rtlCol="0">
+            <a:spAutoFit/>
+          </a:bodyPr>
+          <a:lstStyle/>
+          <a:p>
+            <a:r>
+              <a:rPr lang="fr-FR" dirty="0" smtClean="0"/>
+              <a:t>name: String</a:t>
+            </a:r>
+          </a:p>
+        </p:txBody>
+      </p:sp>
+      <p:sp>
+        <p:nvSpPr>
+          <p:cNvPr id="76" name="Rectangle 75"/>
+          <p:cNvSpPr/>
+          <p:nvPr/>
+        </p:nvSpPr>
+        <p:spPr>
+          <a:xfrm>
+            <a:off x="7501483" y="2884294"/>
+            <a:ext cx="1501416" cy="1233428"/>
+          </a:xfrm>
+          <a:prstGeom prst="rect">
+            <a:avLst/>
+          </a:prstGeom>
+        </p:spPr>
+        <p:style>
+          <a:lnRef idx="2">
+            <a:schemeClr val="accent1"/>
+          </a:lnRef>
+          <a:fillRef idx="1">
+            <a:schemeClr val="lt1"/>
+          </a:fillRef>
+          <a:effectRef idx="0">
+            <a:schemeClr val="accent1"/>
+          </a:effectRef>
+          <a:fontRef idx="minor">
+            <a:schemeClr val="dk1"/>
+          </a:fontRef>
+        </p:style>
+        <p:txBody>
+          <a:bodyPr rtlCol="0" anchor="t" anchorCtr="0"/>
+          <a:lstStyle/>
+          <a:p>
+            <a:pPr algn="ctr"/>
+            <a:r>
+              <a:rPr lang="fr-FR" b="1" dirty="0" err="1" smtClean="0">
+                <a:effectLst>
+                  <a:outerShdw blurRad="38100" dist="38100" dir="2700000" algn="tl">
+                    <a:srgbClr val="000000">
+                      <a:alpha val="43137"/>
+                    </a:srgbClr>
+                  </a:outerShdw>
+                </a:effectLst>
+              </a:rPr>
+              <a:t>ExcelGroup</a:t>
+            </a:r>
+            <a:endParaRPr lang="en-US" b="1" dirty="0">
+              <a:effectLst>
+                <a:outerShdw blurRad="38100" dist="38100" dir="2700000" algn="tl">
+                  <a:srgbClr val="000000">
+                    <a:alpha val="43137"/>
+                  </a:srgbClr>
+                </a:outerShdw>
+              </a:effectLst>
+            </a:endParaRPr>
+          </a:p>
+        </p:txBody>
+      </p:sp>
+      <p:sp>
+        <p:nvSpPr>
+          <p:cNvPr id="77" name="ZoneTexte 76"/>
+          <p:cNvSpPr txBox="1"/>
+          <p:nvPr/>
+        </p:nvSpPr>
+        <p:spPr>
+          <a:xfrm>
+            <a:off x="7564412" y="3275692"/>
+            <a:ext cx="1378904" cy="369332"/>
+          </a:xfrm>
+          <a:prstGeom prst="rect">
+            <a:avLst/>
+          </a:prstGeom>
+          <a:noFill/>
+        </p:spPr>
+        <p:txBody>
+          <a:bodyPr wrap="none" rtlCol="0">
+            <a:spAutoFit/>
+          </a:bodyPr>
+          <a:lstStyle/>
+          <a:p>
+            <a:r>
+              <a:rPr lang="fr-FR" dirty="0" smtClean="0"/>
+              <a:t>name: String</a:t>
+            </a:r>
+            <a:endParaRPr lang="en-US" dirty="0"/>
+          </a:p>
+        </p:txBody>
+      </p:sp>
+      <p:cxnSp>
+        <p:nvCxnSpPr>
+          <p:cNvPr id="96" name="Connecteur en angle 95"/>
+          <p:cNvCxnSpPr>
+            <a:stCxn id="72" idx="0"/>
+            <a:endCxn id="4" idx="2"/>
+          </p:cNvCxnSpPr>
+          <p:nvPr/>
+        </p:nvCxnSpPr>
+        <p:spPr>
+          <a:xfrm rot="5400000" flipH="1" flipV="1">
+            <a:off x="3111126" y="1457787"/>
+            <a:ext cx="1487628" cy="1362111"/>
+          </a:xfrm>
+          <a:prstGeom prst="bentConnector3">
+            <a:avLst>
+              <a:gd name="adj1" fmla="val 50000"/>
+            </a:avLst>
+          </a:prstGeom>
+          <a:ln>
+            <a:tailEnd type="triangle" w="lg" len="lg"/>
+          </a:ln>
+        </p:spPr>
+        <p:style>
+          <a:lnRef idx="3">
+            <a:schemeClr val="dk1"/>
+          </a:lnRef>
+          <a:fillRef idx="0">
+            <a:schemeClr val="dk1"/>
+          </a:fillRef>
+          <a:effectRef idx="2">
+            <a:schemeClr val="dk1"/>
+          </a:effectRef>
+          <a:fontRef idx="minor">
+            <a:schemeClr val="tx1"/>
+          </a:fontRef>
+        </p:style>
+      </p:cxnSp>
+      <p:cxnSp>
+        <p:nvCxnSpPr>
+          <p:cNvPr id="99" name="Connecteur en angle 98"/>
+          <p:cNvCxnSpPr>
+            <a:stCxn id="70" idx="0"/>
+            <a:endCxn id="4" idx="2"/>
+          </p:cNvCxnSpPr>
+          <p:nvPr/>
+        </p:nvCxnSpPr>
+        <p:spPr>
+          <a:xfrm rot="5400000" flipH="1" flipV="1">
+            <a:off x="2023962" y="370622"/>
+            <a:ext cx="1487628" cy="3536440"/>
+          </a:xfrm>
+          <a:prstGeom prst="bentConnector3">
+            <a:avLst>
+              <a:gd name="adj1" fmla="val 50000"/>
+            </a:avLst>
+          </a:prstGeom>
+          <a:ln>
+            <a:tailEnd type="triangle" w="lg" len="lg"/>
+          </a:ln>
+        </p:spPr>
+        <p:style>
+          <a:lnRef idx="3">
+            <a:schemeClr val="dk1"/>
+          </a:lnRef>
+          <a:fillRef idx="0">
+            <a:schemeClr val="dk1"/>
+          </a:fillRef>
+          <a:effectRef idx="2">
+            <a:schemeClr val="dk1"/>
+          </a:effectRef>
+          <a:fontRef idx="minor">
+            <a:schemeClr val="tx1"/>
+          </a:fontRef>
+        </p:style>
+      </p:cxnSp>
+      <p:cxnSp>
+        <p:nvCxnSpPr>
+          <p:cNvPr id="102" name="Connecteur en angle 101"/>
+          <p:cNvCxnSpPr>
+            <a:stCxn id="76" idx="0"/>
+            <a:endCxn id="4" idx="2"/>
+          </p:cNvCxnSpPr>
+          <p:nvPr/>
+        </p:nvCxnSpPr>
+        <p:spPr>
+          <a:xfrm rot="16200000" flipV="1">
+            <a:off x="5649461" y="281563"/>
+            <a:ext cx="1489266" cy="3716195"/>
+          </a:xfrm>
+          <a:prstGeom prst="bentConnector3">
+            <a:avLst>
+              <a:gd name="adj1" fmla="val 50000"/>
+            </a:avLst>
+          </a:prstGeom>
+          <a:ln>
+            <a:tailEnd type="triangle" w="lg" len="lg"/>
+          </a:ln>
+        </p:spPr>
+        <p:style>
+          <a:lnRef idx="3">
+            <a:schemeClr val="dk1"/>
+          </a:lnRef>
+          <a:fillRef idx="0">
+            <a:schemeClr val="dk1"/>
+          </a:fillRef>
+          <a:effectRef idx="2">
+            <a:schemeClr val="dk1"/>
+          </a:effectRef>
+          <a:fontRef idx="minor">
+            <a:schemeClr val="tx1"/>
+          </a:fontRef>
+        </p:style>
+      </p:cxnSp>
+      <p:cxnSp>
+        <p:nvCxnSpPr>
+          <p:cNvPr id="133" name="Connecteur droit avec flèche 132"/>
+          <p:cNvCxnSpPr>
+            <a:stCxn id="76" idx="1"/>
+          </p:cNvCxnSpPr>
+          <p:nvPr/>
+        </p:nvCxnSpPr>
+        <p:spPr>
+          <a:xfrm flipH="1">
+            <a:off x="6493371" y="3501008"/>
+            <a:ext cx="1008112" cy="13490"/>
+          </a:xfrm>
+          <a:prstGeom prst="straightConnector1">
+            <a:avLst/>
+          </a:prstGeom>
+          <a:ln>
+            <a:headEnd type="arrow"/>
+            <a:tailEnd type="arrow"/>
+          </a:ln>
+        </p:spPr>
+        <p:style>
+          <a:lnRef idx="3">
+            <a:schemeClr val="accent2"/>
+          </a:lnRef>
+          <a:fillRef idx="0">
+            <a:schemeClr val="accent2"/>
+          </a:fillRef>
+          <a:effectRef idx="2">
+            <a:schemeClr val="accent2"/>
+          </a:effectRef>
+          <a:fontRef idx="minor">
+            <a:schemeClr val="tx1"/>
+          </a:fontRef>
+        </p:style>
+      </p:cxnSp>
+      <p:cxnSp>
+        <p:nvCxnSpPr>
+          <p:cNvPr id="141" name="Connecteur droit avec flèche 140"/>
+          <p:cNvCxnSpPr>
+            <a:stCxn id="72" idx="3"/>
+          </p:cNvCxnSpPr>
+          <p:nvPr/>
+        </p:nvCxnSpPr>
+        <p:spPr>
+          <a:xfrm flipV="1">
+            <a:off x="3857961" y="3495542"/>
+            <a:ext cx="858055" cy="1"/>
+          </a:xfrm>
+          <a:prstGeom prst="straightConnector1">
+            <a:avLst/>
+          </a:prstGeom>
+          <a:ln>
+            <a:headEnd type="diamond" w="lg" len="lg"/>
+            <a:tailEnd type="arrow"/>
+          </a:ln>
+        </p:spPr>
+        <p:style>
+          <a:lnRef idx="3">
+            <a:schemeClr val="accent3"/>
+          </a:lnRef>
+          <a:fillRef idx="0">
+            <a:schemeClr val="accent3"/>
+          </a:fillRef>
+          <a:effectRef idx="2">
+            <a:schemeClr val="accent3"/>
+          </a:effectRef>
+          <a:fontRef idx="minor">
+            <a:schemeClr val="tx1"/>
+          </a:fontRef>
+        </p:style>
+      </p:cxnSp>
+      <p:cxnSp>
+        <p:nvCxnSpPr>
+          <p:cNvPr id="144" name="Connecteur droit avec flèche 143"/>
+          <p:cNvCxnSpPr>
+            <a:stCxn id="70" idx="3"/>
+            <a:endCxn id="72" idx="1"/>
+          </p:cNvCxnSpPr>
+          <p:nvPr/>
+        </p:nvCxnSpPr>
+        <p:spPr>
+          <a:xfrm>
+            <a:off x="1899656" y="3495543"/>
+            <a:ext cx="590153" cy="0"/>
+          </a:xfrm>
+          <a:prstGeom prst="straightConnector1">
+            <a:avLst/>
+          </a:prstGeom>
+          <a:ln>
+            <a:headEnd type="diamond" w="lg" len="lg"/>
+            <a:tailEnd type="arrow"/>
+          </a:ln>
+        </p:spPr>
+        <p:style>
+          <a:lnRef idx="3">
+            <a:schemeClr val="accent3"/>
+          </a:lnRef>
+          <a:fillRef idx="0">
+            <a:schemeClr val="accent3"/>
+          </a:fillRef>
+          <a:effectRef idx="2">
+            <a:schemeClr val="accent3"/>
+          </a:effectRef>
+          <a:fontRef idx="minor">
+            <a:schemeClr val="tx1"/>
+          </a:fontRef>
+        </p:style>
+      </p:cxnSp>
+      <p:sp>
+        <p:nvSpPr>
+          <p:cNvPr id="148" name="ZoneTexte 147"/>
+          <p:cNvSpPr txBox="1"/>
+          <p:nvPr/>
+        </p:nvSpPr>
+        <p:spPr>
+          <a:xfrm>
+            <a:off x="6516216" y="3131676"/>
+            <a:ext cx="300082" cy="369332"/>
+          </a:xfrm>
+          <a:prstGeom prst="rect">
+            <a:avLst/>
+          </a:prstGeom>
+          <a:noFill/>
+        </p:spPr>
+        <p:txBody>
+          <a:bodyPr wrap="none" rtlCol="0">
+            <a:spAutoFit/>
+          </a:bodyPr>
+          <a:lstStyle/>
+          <a:p>
+            <a:r>
+              <a:rPr lang="fr-FR" dirty="0" smtClean="0"/>
+              <a:t>*</a:t>
+            </a:r>
+            <a:endParaRPr lang="en-US" dirty="0"/>
+          </a:p>
+        </p:txBody>
+      </p:sp>
+      <p:sp>
+        <p:nvSpPr>
+          <p:cNvPr id="149" name="ZoneTexte 148"/>
+          <p:cNvSpPr txBox="1"/>
+          <p:nvPr/>
+        </p:nvSpPr>
+        <p:spPr>
+          <a:xfrm>
+            <a:off x="7224246" y="3100318"/>
+            <a:ext cx="300082" cy="369332"/>
+          </a:xfrm>
+          <a:prstGeom prst="rect">
+            <a:avLst/>
+          </a:prstGeom>
+          <a:noFill/>
+        </p:spPr>
+        <p:txBody>
+          <a:bodyPr wrap="none" rtlCol="0">
+            <a:spAutoFit/>
+          </a:bodyPr>
+          <a:lstStyle/>
+          <a:p>
+            <a:r>
+              <a:rPr lang="fr-FR" dirty="0" smtClean="0"/>
+              <a:t>*</a:t>
+            </a:r>
+            <a:endParaRPr lang="en-US" dirty="0"/>
+          </a:p>
+        </p:txBody>
+      </p:sp>
+      <p:grpSp>
+        <p:nvGrpSpPr>
+          <p:cNvPr id="177" name="Groupe 176"/>
+          <p:cNvGrpSpPr/>
+          <p:nvPr/>
+        </p:nvGrpSpPr>
+        <p:grpSpPr>
+          <a:xfrm>
+            <a:off x="312775" y="713602"/>
+            <a:ext cx="2068967" cy="915198"/>
+            <a:chOff x="312775" y="209546"/>
+            <a:chExt cx="2068967" cy="915198"/>
+          </a:xfrm>
+        </p:grpSpPr>
+        <p:cxnSp>
+          <p:nvCxnSpPr>
+            <p:cNvPr id="167" name="Connecteur droit avec flèche 166"/>
+            <p:cNvCxnSpPr/>
+            <p:nvPr/>
+          </p:nvCxnSpPr>
+          <p:spPr>
+            <a:xfrm flipV="1">
+              <a:off x="312775" y="994995"/>
+              <a:ext cx="590153" cy="1"/>
+            </a:xfrm>
+            <a:prstGeom prst="straightConnector1">
+              <a:avLst/>
+            </a:prstGeom>
+            <a:ln>
+              <a:headEnd type="arrow"/>
+              <a:tailEnd type="arrow"/>
+            </a:ln>
+          </p:spPr>
+          <p:style>
+            <a:lnRef idx="3">
+              <a:schemeClr val="accent2"/>
+            </a:lnRef>
+            <a:fillRef idx="0">
+              <a:schemeClr val="accent2"/>
+            </a:fillRef>
+            <a:effectRef idx="2">
+              <a:schemeClr val="accent2"/>
+            </a:effectRef>
+            <a:fontRef idx="minor">
+              <a:schemeClr val="tx1"/>
+            </a:fontRef>
+          </p:style>
+        </p:cxnSp>
+        <p:cxnSp>
+          <p:nvCxnSpPr>
+            <p:cNvPr id="171" name="Connecteur droit avec flèche 170"/>
+            <p:cNvCxnSpPr/>
+            <p:nvPr/>
+          </p:nvCxnSpPr>
+          <p:spPr>
+            <a:xfrm flipV="1">
+              <a:off x="312776" y="631721"/>
+              <a:ext cx="590153" cy="1"/>
+            </a:xfrm>
+            <a:prstGeom prst="straightConnector1">
+              <a:avLst/>
+            </a:prstGeom>
+            <a:ln>
+              <a:headEnd type="diamond" w="lg" len="lg"/>
+              <a:tailEnd type="arrow"/>
+            </a:ln>
+          </p:spPr>
+          <p:style>
+            <a:lnRef idx="3">
+              <a:schemeClr val="accent3"/>
+            </a:lnRef>
+            <a:fillRef idx="0">
+              <a:schemeClr val="accent3"/>
+            </a:fillRef>
+            <a:effectRef idx="2">
+              <a:schemeClr val="accent3"/>
+            </a:effectRef>
+            <a:fontRef idx="minor">
+              <a:schemeClr val="tx1"/>
+            </a:fontRef>
+          </p:style>
+        </p:cxnSp>
+        <p:cxnSp>
+          <p:nvCxnSpPr>
+            <p:cNvPr id="172" name="Connecteur droit avec flèche 171"/>
+            <p:cNvCxnSpPr/>
+            <p:nvPr/>
+          </p:nvCxnSpPr>
+          <p:spPr>
+            <a:xfrm flipV="1">
+              <a:off x="312776" y="332656"/>
+              <a:ext cx="590153" cy="1"/>
+            </a:xfrm>
+            <a:prstGeom prst="straightConnector1">
+              <a:avLst/>
+            </a:prstGeom>
+            <a:ln>
+              <a:tailEnd type="triangle" w="lg" len="lg"/>
+            </a:ln>
+          </p:spPr>
+          <p:style>
+            <a:lnRef idx="3">
+              <a:schemeClr val="dk1"/>
+            </a:lnRef>
+            <a:fillRef idx="0">
+              <a:schemeClr val="dk1"/>
+            </a:fillRef>
+            <a:effectRef idx="2">
+              <a:schemeClr val="dk1"/>
+            </a:effectRef>
+            <a:fontRef idx="minor">
+              <a:schemeClr val="tx1"/>
+            </a:fontRef>
+          </p:style>
+        </p:cxnSp>
+        <p:sp>
+          <p:nvSpPr>
+            <p:cNvPr id="173" name="Rectangle 1"/>
+            <p:cNvSpPr>
+              <a:spLocks noChangeArrowheads="1"/>
+            </p:cNvSpPr>
+            <p:nvPr/>
+          </p:nvSpPr>
+          <p:spPr bwMode="auto">
+            <a:xfrm>
+              <a:off x="1050102" y="209546"/>
+              <a:ext cx="1331640" cy="246221"/>
+            </a:xfrm>
+            <a:prstGeom prst="rect">
+              <a:avLst/>
+            </a:prstGeom>
+            <a:solidFill>
+              <a:srgbClr val="FFFFFF"/>
+            </a:solidFill>
+            <a:ln>
+              <a:noFill/>
+            </a:ln>
+            <a:effectLst/>
+            <a:extLst>
+              <a:ext uri="{91240B29-F687-4F45-9708-019B960494DF}">
+                <a14:hiddenLine xmlns:a14="http://schemas.microsoft.com/office/drawing/2010/main" w="9525">
+                  <a:solidFill>
+                    <a:schemeClr val="tx1"/>
+                  </a:solidFill>
+                  <a:miter lim="800000"/>
+                  <a:headEnd/>
+                  <a:tailEnd/>
+                </a14:hiddenLine>
+              </a:ext>
+              <a:ext uri="{AF507438-7753-43E0-B8FC-AC1667EBCBE1}">
+                <a14:hiddenEffects xmlns:a14="http://schemas.microsoft.com/office/drawing/2010/main">
+                  <a:effectLst>
+                    <a:outerShdw dist="35921" dir="2700000" algn="ctr" rotWithShape="0">
+                      <a:schemeClr val="bg2"/>
+                    </a:outerShdw>
+                  </a:effectLst>
+                </a14:hiddenEffects>
+              </a:ext>
+            </a:extLst>
+          </p:spPr>
+          <p:txBody>
+            <a:bodyPr vert="horz" wrap="square" lIns="0" tIns="0" rIns="0" bIns="0" numCol="1" anchor="ctr" anchorCtr="0" compatLnSpc="1">
+              <a:prstTxWarp prst="textNoShape">
+                <a:avLst/>
+              </a:prstTxWarp>
+              <a:spAutoFit/>
+            </a:bodyPr>
+            <a:lstStyle/>
+            <a:p>
+              <a:pPr marL="0" marR="0" lvl="0" indent="0" algn="l" defTabSz="914400" rtl="0" eaLnBrk="1" fontAlgn="base" latinLnBrk="0" hangingPunct="1">
+                <a:lnSpc>
+                  <a:spcPct val="100000"/>
+                </a:lnSpc>
+                <a:spcBef>
+                  <a:spcPct val="0"/>
+                </a:spcBef>
+                <a:spcAft>
+                  <a:spcPct val="0"/>
+                </a:spcAft>
+                <a:buClrTx/>
+                <a:buSzTx/>
+                <a:buFontTx/>
+                <a:buNone/>
+                <a:tabLst/>
+              </a:pPr>
+              <a:r>
+                <a:rPr kumimoji="0" lang="en-US" altLang="en-US" sz="1600" b="0" i="0" u="none" strike="noStrike" cap="none" normalizeH="0" baseline="0" dirty="0" smtClean="0">
+                  <a:ln>
+                    <a:noFill/>
+                  </a:ln>
+                  <a:solidFill>
+                    <a:srgbClr val="212121"/>
+                  </a:solidFill>
+                  <a:effectLst/>
+                  <a:cs typeface="Arial" pitchFamily="34" charset="0"/>
+                </a:rPr>
+                <a:t>inheritance</a:t>
+              </a:r>
+              <a:r>
+                <a:rPr kumimoji="0" lang="en-US" altLang="en-US" sz="500" b="0" i="0" u="none" strike="noStrike" cap="none" normalizeH="0" baseline="0" dirty="0" smtClean="0">
+                  <a:ln>
+                    <a:noFill/>
+                  </a:ln>
+                  <a:solidFill>
+                    <a:schemeClr val="tx1"/>
+                  </a:solidFill>
+                  <a:effectLst/>
+                  <a:cs typeface="Arial" pitchFamily="34" charset="0"/>
+                </a:rPr>
+                <a:t> </a:t>
+              </a:r>
+              <a:endParaRPr kumimoji="0" lang="en-US" altLang="en-US" sz="1800" b="0" i="0" u="none" strike="noStrike" cap="none" normalizeH="0" baseline="0" dirty="0" smtClean="0">
+                <a:ln>
+                  <a:noFill/>
+                </a:ln>
+                <a:solidFill>
+                  <a:schemeClr val="tx1"/>
+                </a:solidFill>
+                <a:effectLst/>
+                <a:cs typeface="Arial" pitchFamily="34" charset="0"/>
+              </a:endParaRPr>
+            </a:p>
+          </p:txBody>
+        </p:sp>
+        <p:sp>
+          <p:nvSpPr>
+            <p:cNvPr id="175" name="Rectangle 1"/>
+            <p:cNvSpPr>
+              <a:spLocks noChangeArrowheads="1"/>
+            </p:cNvSpPr>
+            <p:nvPr/>
+          </p:nvSpPr>
+          <p:spPr bwMode="auto">
+            <a:xfrm>
+              <a:off x="1025860" y="518483"/>
+              <a:ext cx="1331640" cy="246221"/>
+            </a:xfrm>
+            <a:prstGeom prst="rect">
+              <a:avLst/>
+            </a:prstGeom>
+            <a:solidFill>
+              <a:srgbClr val="FFFFFF"/>
+            </a:solidFill>
+            <a:ln>
+              <a:noFill/>
+            </a:ln>
+            <a:effectLst/>
+            <a:extLst>
+              <a:ext uri="{91240B29-F687-4F45-9708-019B960494DF}">
+                <a14:hiddenLine xmlns:a14="http://schemas.microsoft.com/office/drawing/2010/main" w="9525">
+                  <a:solidFill>
+                    <a:schemeClr val="tx1"/>
+                  </a:solidFill>
+                  <a:miter lim="800000"/>
+                  <a:headEnd/>
+                  <a:tailEnd/>
+                </a14:hiddenLine>
+              </a:ext>
+              <a:ext uri="{AF507438-7753-43E0-B8FC-AC1667EBCBE1}">
+                <a14:hiddenEffects xmlns:a14="http://schemas.microsoft.com/office/drawing/2010/main">
+                  <a:effectLst>
+                    <a:outerShdw dist="35921" dir="2700000" algn="ctr" rotWithShape="0">
+                      <a:schemeClr val="bg2"/>
+                    </a:outerShdw>
+                  </a:effectLst>
+                </a14:hiddenEffects>
+              </a:ext>
+            </a:extLst>
+          </p:spPr>
+          <p:txBody>
+            <a:bodyPr vert="horz" wrap="square" lIns="0" tIns="0" rIns="0" bIns="0" numCol="1" anchor="ctr" anchorCtr="0" compatLnSpc="1">
+              <a:prstTxWarp prst="textNoShape">
+                <a:avLst/>
+              </a:prstTxWarp>
+              <a:spAutoFit/>
+            </a:bodyPr>
+            <a:lstStyle/>
+            <a:p>
+              <a:pPr lvl="0" fontAlgn="base">
+                <a:spcBef>
+                  <a:spcPct val="0"/>
+                </a:spcBef>
+                <a:spcAft>
+                  <a:spcPct val="0"/>
+                </a:spcAft>
+              </a:pPr>
+              <a:r>
+                <a:rPr lang="en-US" altLang="en-US" sz="1600" dirty="0">
+                  <a:solidFill>
+                    <a:srgbClr val="212121"/>
+                  </a:solidFill>
+                  <a:cs typeface="Arial" pitchFamily="34" charset="0"/>
+                </a:rPr>
+                <a:t>composition</a:t>
+              </a:r>
+              <a:endParaRPr kumimoji="0" lang="en-US" altLang="en-US" sz="1800" b="0" i="0" u="none" strike="noStrike" cap="none" normalizeH="0" baseline="0" dirty="0" smtClean="0">
+                <a:ln>
+                  <a:noFill/>
+                </a:ln>
+                <a:solidFill>
+                  <a:schemeClr val="tx1"/>
+                </a:solidFill>
+                <a:effectLst/>
+                <a:cs typeface="Arial" pitchFamily="34" charset="0"/>
+              </a:endParaRPr>
+            </a:p>
+          </p:txBody>
+        </p:sp>
+        <p:sp>
+          <p:nvSpPr>
+            <p:cNvPr id="176" name="Rectangle 1"/>
+            <p:cNvSpPr>
+              <a:spLocks noChangeArrowheads="1"/>
+            </p:cNvSpPr>
+            <p:nvPr/>
+          </p:nvSpPr>
+          <p:spPr bwMode="auto">
+            <a:xfrm>
+              <a:off x="1038717" y="878523"/>
+              <a:ext cx="1331640" cy="246221"/>
+            </a:xfrm>
+            <a:prstGeom prst="rect">
+              <a:avLst/>
+            </a:prstGeom>
+            <a:solidFill>
+              <a:srgbClr val="FFFFFF"/>
+            </a:solidFill>
+            <a:ln>
+              <a:noFill/>
+            </a:ln>
+            <a:effectLst/>
+            <a:extLst>
+              <a:ext uri="{91240B29-F687-4F45-9708-019B960494DF}">
+                <a14:hiddenLine xmlns:a14="http://schemas.microsoft.com/office/drawing/2010/main" w="9525">
+                  <a:solidFill>
+                    <a:schemeClr val="tx1"/>
+                  </a:solidFill>
+                  <a:miter lim="800000"/>
+                  <a:headEnd/>
+                  <a:tailEnd/>
+                </a14:hiddenLine>
+              </a:ext>
+              <a:ext uri="{AF507438-7753-43E0-B8FC-AC1667EBCBE1}">
+                <a14:hiddenEffects xmlns:a14="http://schemas.microsoft.com/office/drawing/2010/main">
+                  <a:effectLst>
+                    <a:outerShdw dist="35921" dir="2700000" algn="ctr" rotWithShape="0">
+                      <a:schemeClr val="bg2"/>
+                    </a:outerShdw>
+                  </a:effectLst>
+                </a14:hiddenEffects>
+              </a:ext>
+            </a:extLst>
+          </p:spPr>
+          <p:txBody>
+            <a:bodyPr vert="horz" wrap="square" lIns="0" tIns="0" rIns="0" bIns="0" numCol="1" anchor="ctr" anchorCtr="0" compatLnSpc="1">
+              <a:prstTxWarp prst="textNoShape">
+                <a:avLst/>
+              </a:prstTxWarp>
+              <a:spAutoFit/>
+            </a:bodyPr>
+            <a:lstStyle/>
+            <a:p>
+              <a:pPr marL="0" marR="0" lvl="0" indent="0" algn="l" defTabSz="914400" rtl="0" eaLnBrk="1" fontAlgn="base" latinLnBrk="0" hangingPunct="1">
+                <a:lnSpc>
+                  <a:spcPct val="100000"/>
+                </a:lnSpc>
+                <a:spcBef>
+                  <a:spcPct val="0"/>
+                </a:spcBef>
+                <a:spcAft>
+                  <a:spcPct val="0"/>
+                </a:spcAft>
+                <a:buClrTx/>
+                <a:buSzTx/>
+                <a:buFontTx/>
+                <a:buNone/>
+                <a:tabLst/>
+              </a:pPr>
+              <a:r>
+                <a:rPr kumimoji="0" lang="en-US" altLang="en-US" sz="1600" b="0" i="0" u="none" strike="noStrike" cap="none" normalizeH="0" baseline="0" dirty="0" smtClean="0">
+                  <a:ln>
+                    <a:noFill/>
+                  </a:ln>
+                  <a:solidFill>
+                    <a:srgbClr val="212121"/>
+                  </a:solidFill>
+                  <a:effectLst/>
+                  <a:cs typeface="Arial" pitchFamily="34" charset="0"/>
+                </a:rPr>
+                <a:t>reference</a:t>
+              </a:r>
+              <a:endParaRPr kumimoji="0" lang="en-US" altLang="en-US" sz="1800" b="0" i="0" u="none" strike="noStrike" cap="none" normalizeH="0" baseline="0" dirty="0" smtClean="0">
+                <a:ln>
+                  <a:noFill/>
+                </a:ln>
+                <a:solidFill>
+                  <a:schemeClr val="tx1"/>
+                </a:solidFill>
+                <a:effectLst/>
+                <a:cs typeface="Arial" pitchFamily="34" charset="0"/>
+              </a:endParaRPr>
+            </a:p>
+          </p:txBody>
+        </p:sp>
+      </p:grpSp>
+      <p:sp>
+        <p:nvSpPr>
+          <p:cNvPr id="2" name="Rectangle 1"/>
+          <p:cNvSpPr/>
+          <p:nvPr/>
+        </p:nvSpPr>
+        <p:spPr>
+          <a:xfrm>
+            <a:off x="2627784" y="3573016"/>
+            <a:ext cx="1023678" cy="369332"/>
+          </a:xfrm>
+          <a:prstGeom prst="rect">
+            <a:avLst/>
+          </a:prstGeom>
+        </p:spPr>
+        <p:txBody>
+          <a:bodyPr wrap="none">
+            <a:spAutoFit/>
+          </a:bodyPr>
+          <a:lstStyle/>
+          <a:p>
+            <a:r>
+              <a:rPr lang="fr-FR" dirty="0" smtClean="0"/>
+              <a:t>cells</a:t>
+            </a:r>
+            <a:r>
+              <a:rPr lang="fr-FR" dirty="0"/>
+              <a:t>: List</a:t>
+            </a:r>
+            <a:endParaRPr lang="en-US" dirty="0"/>
+          </a:p>
+        </p:txBody>
+      </p:sp>
+      <p:sp>
+        <p:nvSpPr>
+          <p:cNvPr id="34" name="Rectangle 33"/>
+          <p:cNvSpPr/>
+          <p:nvPr/>
+        </p:nvSpPr>
+        <p:spPr>
+          <a:xfrm>
+            <a:off x="251520" y="3635732"/>
+            <a:ext cx="1222835" cy="369332"/>
+          </a:xfrm>
+          <a:prstGeom prst="rect">
+            <a:avLst/>
+          </a:prstGeom>
+        </p:spPr>
+        <p:txBody>
+          <a:bodyPr wrap="none">
+            <a:spAutoFit/>
+          </a:bodyPr>
+          <a:lstStyle/>
+          <a:p>
+            <a:r>
+              <a:rPr lang="fr-FR" dirty="0" smtClean="0"/>
+              <a:t>sheets: </a:t>
+            </a:r>
+            <a:r>
+              <a:rPr lang="fr-FR" dirty="0"/>
+              <a:t>List</a:t>
+            </a:r>
+            <a:endParaRPr lang="en-US" dirty="0"/>
+          </a:p>
+        </p:txBody>
+      </p:sp>
+      <p:sp>
+        <p:nvSpPr>
+          <p:cNvPr id="36" name="Rectangle 35"/>
+          <p:cNvSpPr/>
+          <p:nvPr/>
+        </p:nvSpPr>
+        <p:spPr>
+          <a:xfrm>
+            <a:off x="4955095" y="4283804"/>
+            <a:ext cx="1254446" cy="369332"/>
+          </a:xfrm>
+          <a:prstGeom prst="rect">
+            <a:avLst/>
+          </a:prstGeom>
+        </p:spPr>
+        <p:txBody>
+          <a:bodyPr wrap="none">
+            <a:spAutoFit/>
+          </a:bodyPr>
+          <a:lstStyle/>
+          <a:p>
+            <a:r>
+              <a:rPr lang="fr-FR" dirty="0" smtClean="0"/>
+              <a:t>groups: </a:t>
+            </a:r>
+            <a:r>
+              <a:rPr lang="fr-FR" dirty="0"/>
+              <a:t>List</a:t>
+            </a:r>
+            <a:endParaRPr lang="en-US" dirty="0"/>
+          </a:p>
+        </p:txBody>
+      </p:sp>
+      <p:sp>
+        <p:nvSpPr>
+          <p:cNvPr id="45" name="Rectangle 44"/>
+          <p:cNvSpPr/>
+          <p:nvPr/>
+        </p:nvSpPr>
+        <p:spPr>
+          <a:xfrm>
+            <a:off x="7740352" y="3627596"/>
+            <a:ext cx="1023678" cy="369332"/>
+          </a:xfrm>
+          <a:prstGeom prst="rect">
+            <a:avLst/>
+          </a:prstGeom>
+        </p:spPr>
+        <p:txBody>
+          <a:bodyPr wrap="none">
+            <a:spAutoFit/>
+          </a:bodyPr>
+          <a:lstStyle/>
+          <a:p>
+            <a:r>
+              <a:rPr lang="fr-FR" dirty="0" smtClean="0"/>
+              <a:t>cells</a:t>
+            </a:r>
+            <a:r>
+              <a:rPr lang="fr-FR" dirty="0"/>
+              <a:t>: List</a:t>
+            </a:r>
+            <a:endParaRPr lang="en-US" dirty="0"/>
+          </a:p>
+        </p:txBody>
+      </p:sp>
     </p:spTree>
     <p:extLst>
       <p:ext uri="{BB962C8B-B14F-4D97-AF65-F5344CB8AC3E}">

</xml_diff>